<commit_message>
ki kare örneği eklendi
</commit_message>
<xml_diff>
--- a/cihan.pptx
+++ b/cihan.pptx
@@ -5,7 +5,7 @@
     <p:sldMasterId id="2147483648" r:id="rId1"/>
   </p:sldMasterIdLst>
   <p:notesMasterIdLst>
-    <p:notesMasterId r:id="rId15"/>
+    <p:notesMasterId r:id="rId16"/>
   </p:notesMasterIdLst>
   <p:sldIdLst>
     <p:sldId id="256" r:id="rId2"/>
@@ -18,9 +18,10 @@
     <p:sldId id="272" r:id="rId9"/>
     <p:sldId id="257" r:id="rId10"/>
     <p:sldId id="265" r:id="rId11"/>
-    <p:sldId id="269" r:id="rId12"/>
-    <p:sldId id="268" r:id="rId13"/>
-    <p:sldId id="266" r:id="rId14"/>
+    <p:sldId id="274" r:id="rId12"/>
+    <p:sldId id="269" r:id="rId13"/>
+    <p:sldId id="268" r:id="rId14"/>
+    <p:sldId id="266" r:id="rId15"/>
   </p:sldIdLst>
   <p:sldSz cx="12192000" cy="6858000"/>
   <p:notesSz cx="6858000" cy="9144000"/>
@@ -134,6 +135,7 @@
             <p14:sldId id="272"/>
             <p14:sldId id="257"/>
             <p14:sldId id="265"/>
+            <p14:sldId id="274"/>
             <p14:sldId id="269"/>
             <p14:sldId id="268"/>
             <p14:sldId id="266"/>
@@ -230,7 +232,7 @@
           <a:p>
             <a:fld id="{4ADB7896-6128-431E-B81D-BC3E8A939DF8}" type="datetimeFigureOut">
               <a:rPr lang="tr-TR" smtClean="0"/>
-              <a:t>7.03.2021</a:t>
+              <a:t>8.03.2021</a:t>
             </a:fld>
             <a:endParaRPr lang="tr-TR" dirty="0"/>
           </a:p>
@@ -728,7 +730,7 @@
           <a:p>
             <a:fld id="{C4F64304-6163-4612-B6CC-CF554652777C}" type="datetime1">
               <a:rPr lang="tr-TR" smtClean="0"/>
-              <a:t>7.03.2021</a:t>
+              <a:t>8.03.2021</a:t>
             </a:fld>
             <a:endParaRPr lang="tr-TR" dirty="0"/>
           </a:p>
@@ -926,7 +928,7 @@
           <a:p>
             <a:fld id="{78E7E6B6-D9D2-4867-B7C0-A8640A2186AF}" type="datetime1">
               <a:rPr lang="tr-TR" smtClean="0"/>
-              <a:t>7.03.2021</a:t>
+              <a:t>8.03.2021</a:t>
             </a:fld>
             <a:endParaRPr lang="tr-TR" dirty="0"/>
           </a:p>
@@ -1134,7 +1136,7 @@
           <a:p>
             <a:fld id="{F0029F82-7E47-4E9E-B49D-003C4E36A632}" type="datetime1">
               <a:rPr lang="tr-TR" smtClean="0"/>
-              <a:t>7.03.2021</a:t>
+              <a:t>8.03.2021</a:t>
             </a:fld>
             <a:endParaRPr lang="tr-TR" dirty="0"/>
           </a:p>
@@ -1332,7 +1334,7 @@
           <a:p>
             <a:fld id="{CF615725-F917-45E6-9A33-770A3F590BE7}" type="datetime1">
               <a:rPr lang="tr-TR" smtClean="0"/>
-              <a:t>7.03.2021</a:t>
+              <a:t>8.03.2021</a:t>
             </a:fld>
             <a:endParaRPr lang="tr-TR" dirty="0"/>
           </a:p>
@@ -1607,7 +1609,7 @@
           <a:p>
             <a:fld id="{E18C5DAA-DAD0-4152-ABE7-15F5D3DD21B8}" type="datetime1">
               <a:rPr lang="tr-TR" smtClean="0"/>
-              <a:t>7.03.2021</a:t>
+              <a:t>8.03.2021</a:t>
             </a:fld>
             <a:endParaRPr lang="tr-TR" dirty="0"/>
           </a:p>
@@ -1872,7 +1874,7 @@
           <a:p>
             <a:fld id="{5A40177A-5F39-4786-B0C5-D32D690533B8}" type="datetime1">
               <a:rPr lang="tr-TR" smtClean="0"/>
-              <a:t>7.03.2021</a:t>
+              <a:t>8.03.2021</a:t>
             </a:fld>
             <a:endParaRPr lang="tr-TR" dirty="0"/>
           </a:p>
@@ -2284,7 +2286,7 @@
           <a:p>
             <a:fld id="{51B634AD-DE2D-4170-92BE-8FFFC830162A}" type="datetime1">
               <a:rPr lang="tr-TR" smtClean="0"/>
-              <a:t>7.03.2021</a:t>
+              <a:t>8.03.2021</a:t>
             </a:fld>
             <a:endParaRPr lang="tr-TR" dirty="0"/>
           </a:p>
@@ -2425,7 +2427,7 @@
           <a:p>
             <a:fld id="{5EBF6B0F-81F5-4D2C-9E10-7B30CA3ED86B}" type="datetime1">
               <a:rPr lang="tr-TR" smtClean="0"/>
-              <a:t>7.03.2021</a:t>
+              <a:t>8.03.2021</a:t>
             </a:fld>
             <a:endParaRPr lang="tr-TR" dirty="0"/>
           </a:p>
@@ -2538,7 +2540,7 @@
           <a:p>
             <a:fld id="{145C6B24-78D7-4D46-AFC1-1B9D14CA92C8}" type="datetime1">
               <a:rPr lang="tr-TR" smtClean="0"/>
-              <a:t>7.03.2021</a:t>
+              <a:t>8.03.2021</a:t>
             </a:fld>
             <a:endParaRPr lang="tr-TR" dirty="0"/>
           </a:p>
@@ -2849,7 +2851,7 @@
           <a:p>
             <a:fld id="{9D677EBC-1F1C-43C2-9E12-430A11728EC8}" type="datetime1">
               <a:rPr lang="tr-TR" smtClean="0"/>
-              <a:t>7.03.2021</a:t>
+              <a:t>8.03.2021</a:t>
             </a:fld>
             <a:endParaRPr lang="tr-TR" dirty="0"/>
           </a:p>
@@ -3137,7 +3139,7 @@
           <a:p>
             <a:fld id="{A3AC46AC-EF7A-4D03-B6E8-A1A70CC64AD3}" type="datetime1">
               <a:rPr lang="tr-TR" smtClean="0"/>
-              <a:t>7.03.2021</a:t>
+              <a:t>8.03.2021</a:t>
             </a:fld>
             <a:endParaRPr lang="tr-TR" dirty="0"/>
           </a:p>
@@ -3378,7 +3380,7 @@
           <a:p>
             <a:fld id="{E4C454CE-1031-4CA2-988B-B2C8308F4A12}" type="datetime1">
               <a:rPr lang="tr-TR" smtClean="0"/>
-              <a:t>7.03.2021</a:t>
+              <a:t>8.03.2021</a:t>
             </a:fld>
             <a:endParaRPr lang="tr-TR" dirty="0"/>
           </a:p>
@@ -7238,6 +7240,634 @@
 <file path=ppt/slides/slide11.xml><?xml version="1.0" encoding="utf-8"?>
 <p:sld xmlns:a="http://schemas.openxmlformats.org/drawingml/2006/main" xmlns:r="http://schemas.openxmlformats.org/officeDocument/2006/relationships" xmlns:p="http://schemas.openxmlformats.org/presentationml/2006/main">
   <p:cSld>
+    <p:spTree>
+      <p:nvGrpSpPr>
+        <p:cNvPr id="1" name=""/>
+        <p:cNvGrpSpPr/>
+        <p:nvPr/>
+      </p:nvGrpSpPr>
+      <p:grpSpPr>
+        <a:xfrm>
+          <a:off x="0" y="0"/>
+          <a:ext cx="0" cy="0"/>
+          <a:chOff x="0" y="0"/>
+          <a:chExt cx="0" cy="0"/>
+        </a:xfrm>
+      </p:grpSpPr>
+      <p:sp>
+        <p:nvSpPr>
+          <p:cNvPr id="4" name="Slayt Numarası Yer Tutucusu 3">
+            <a:extLst>
+              <a:ext uri="{FF2B5EF4-FFF2-40B4-BE49-F238E27FC236}">
+                <a16:creationId xmlns:a16="http://schemas.microsoft.com/office/drawing/2014/main" id="{2209E079-8F91-4BBA-976C-8A73D3AB321F}"/>
+              </a:ext>
+            </a:extLst>
+          </p:cNvPr>
+          <p:cNvSpPr>
+            <a:spLocks noGrp="1"/>
+          </p:cNvSpPr>
+          <p:nvPr>
+            <p:ph type="sldNum" sz="quarter" idx="12"/>
+          </p:nvPr>
+        </p:nvSpPr>
+        <p:spPr>
+          <a:xfrm>
+            <a:off x="8610600" y="6356350"/>
+            <a:ext cx="2743200" cy="365125"/>
+          </a:xfrm>
+        </p:spPr>
+        <p:txBody>
+          <a:bodyPr>
+            <a:normAutofit/>
+          </a:bodyPr>
+          <a:lstStyle/>
+          <a:p>
+            <a:pPr>
+              <a:spcAft>
+                <a:spcPts val="600"/>
+              </a:spcAft>
+            </a:pPr>
+            <a:fld id="{3F69A0C6-7921-40C0-9BF7-29A90F37EBCE}" type="slidenum">
+              <a:rPr lang="tr-TR" smtClean="0"/>
+              <a:pPr>
+                <a:spcAft>
+                  <a:spcPts val="600"/>
+                </a:spcAft>
+              </a:pPr>
+              <a:t>11</a:t>
+            </a:fld>
+            <a:endParaRPr lang="tr-TR"/>
+          </a:p>
+        </p:txBody>
+      </p:sp>
+      <p:sp>
+        <p:nvSpPr>
+          <p:cNvPr id="12" name="İçerik Yer Tutucusu 2">
+            <a:extLst>
+              <a:ext uri="{FF2B5EF4-FFF2-40B4-BE49-F238E27FC236}">
+                <a16:creationId xmlns:a16="http://schemas.microsoft.com/office/drawing/2014/main" id="{FB188065-B890-44AD-A845-4D1E751B6B9D}"/>
+              </a:ext>
+            </a:extLst>
+          </p:cNvPr>
+          <p:cNvSpPr>
+            <a:spLocks noGrp="1"/>
+          </p:cNvSpPr>
+          <p:nvPr>
+            <p:ph idx="1"/>
+          </p:nvPr>
+        </p:nvSpPr>
+        <p:spPr>
+          <a:xfrm>
+            <a:off x="789126" y="1518020"/>
+            <a:ext cx="8342530" cy="4838330"/>
+          </a:xfrm>
+        </p:spPr>
+        <p:txBody>
+          <a:bodyPr anchor="ctr">
+            <a:normAutofit fontScale="92500" lnSpcReduction="10000"/>
+          </a:bodyPr>
+          <a:lstStyle/>
+          <a:p>
+            <a:pPr marL="0" indent="0">
+              <a:buNone/>
+            </a:pPr>
+            <a:endParaRPr lang="tr-TR" sz="1500" b="0" i="0" u="none" strike="noStrike" baseline="0" dirty="0">
+              <a:solidFill>
+                <a:schemeClr val="tx2"/>
+              </a:solidFill>
+              <a:latin typeface="Times New Roman" panose="02020603050405020304" pitchFamily="18" charset="0"/>
+              <a:cs typeface="Times New Roman" panose="02020603050405020304" pitchFamily="18" charset="0"/>
+            </a:endParaRPr>
+          </a:p>
+          <a:p>
+            <a:pPr marL="0" indent="0">
+              <a:buNone/>
+            </a:pPr>
+            <a:r>
+              <a:rPr lang="tr-TR" sz="2400" b="0" i="0" u="none" strike="noStrike" baseline="0" dirty="0">
+                <a:solidFill>
+                  <a:schemeClr val="tx1">
+                    <a:lumMod val="95000"/>
+                    <a:lumOff val="5000"/>
+                  </a:schemeClr>
+                </a:solidFill>
+                <a:latin typeface="Times New Roman" panose="02020603050405020304" pitchFamily="18" charset="0"/>
+                <a:cs typeface="Times New Roman" panose="02020603050405020304" pitchFamily="18" charset="0"/>
+              </a:rPr>
+              <a:t>Örneğin rastgele seçilen 90 ev hanımının çamaşırda tercih ettikleri deterjan markasına göre dağılımı aşağıdaki gibi olsun;</a:t>
+            </a:r>
+          </a:p>
+          <a:p>
+            <a:pPr marL="0" indent="0">
+              <a:buNone/>
+            </a:pPr>
+            <a:endParaRPr lang="tr-TR" sz="1500" b="0" i="0" u="none" strike="noStrike" baseline="0" dirty="0">
+              <a:solidFill>
+                <a:schemeClr val="tx2"/>
+              </a:solidFill>
+              <a:latin typeface="Times New Roman" panose="02020603050405020304" pitchFamily="18" charset="0"/>
+              <a:cs typeface="Times New Roman" panose="02020603050405020304" pitchFamily="18" charset="0"/>
+            </a:endParaRPr>
+          </a:p>
+          <a:p>
+            <a:pPr marL="0" algn="l" rtl="0" eaLnBrk="1" fontAlgn="t" latinLnBrk="0" hangingPunct="1">
+              <a:spcBef>
+                <a:spcPts val="0"/>
+              </a:spcBef>
+              <a:spcAft>
+                <a:spcPts val="0"/>
+              </a:spcAft>
+            </a:pPr>
+            <a:r>
+              <a:rPr lang="tr-TR" sz="1800" b="1" i="0" u="none" strike="noStrike" kern="1200" dirty="0">
+                <a:solidFill>
+                  <a:srgbClr val="FFFFFF"/>
+                </a:solidFill>
+                <a:effectLst/>
+                <a:latin typeface="Calibri" panose="020F0502020204030204" pitchFamily="34" charset="0"/>
+              </a:rPr>
+              <a:t>Sınıflar (Deterjan Markası)            A       B       C       D       E       F               TOPLAM </a:t>
+            </a:r>
+            <a:endParaRPr lang="tr-TR" sz="1800" b="0" i="0" u="none" strike="noStrike" dirty="0">
+              <a:effectLst/>
+              <a:latin typeface="Arial" panose="020B0604020202020204" pitchFamily="34" charset="0"/>
+            </a:endParaRPr>
+          </a:p>
+          <a:p>
+            <a:pPr marL="0" indent="0">
+              <a:buNone/>
+            </a:pPr>
+            <a:endParaRPr lang="tr-TR" sz="1500" dirty="0">
+              <a:solidFill>
+                <a:schemeClr val="tx2"/>
+              </a:solidFill>
+            </a:endParaRPr>
+          </a:p>
+          <a:p>
+            <a:pPr marL="0" algn="l" rtl="0" eaLnBrk="1" fontAlgn="t" latinLnBrk="0" hangingPunct="1">
+              <a:spcBef>
+                <a:spcPts val="0"/>
+              </a:spcBef>
+              <a:spcAft>
+                <a:spcPts val="0"/>
+              </a:spcAft>
+            </a:pPr>
+            <a:r>
+              <a:rPr lang="tr-TR" sz="1800" b="1" i="0" u="none" strike="noStrike" kern="1200" dirty="0">
+                <a:solidFill>
+                  <a:srgbClr val="FFFFFF"/>
+                </a:solidFill>
+                <a:effectLst/>
+                <a:latin typeface="Calibri" panose="020F0502020204030204" pitchFamily="34" charset="0"/>
+              </a:rPr>
+              <a:t>Sınıflar (Deterjan Markası)            A       B       C       D       E       F               TOPLAM </a:t>
+            </a:r>
+            <a:endParaRPr lang="tr-TR" sz="1800" b="0" i="0" u="none" strike="noStrike" dirty="0">
+              <a:effectLst/>
+              <a:latin typeface="Arial" panose="020B0604020202020204" pitchFamily="34" charset="0"/>
+            </a:endParaRPr>
+          </a:p>
+          <a:p>
+            <a:pPr marL="0" indent="0">
+              <a:buNone/>
+            </a:pPr>
+            <a:endParaRPr lang="tr-TR" sz="1500" dirty="0">
+              <a:solidFill>
+                <a:schemeClr val="tx2"/>
+              </a:solidFill>
+            </a:endParaRPr>
+          </a:p>
+          <a:p>
+            <a:endParaRPr lang="tr-TR" sz="1500" b="0" i="0" u="none" strike="noStrike" baseline="0" dirty="0">
+              <a:solidFill>
+                <a:schemeClr val="tx2"/>
+              </a:solidFill>
+              <a:latin typeface="Arial" panose="020B0604020202020204" pitchFamily="34" charset="0"/>
+            </a:endParaRPr>
+          </a:p>
+          <a:p>
+            <a:pPr marL="0" indent="0">
+              <a:buNone/>
+            </a:pPr>
+            <a:endParaRPr lang="tr-TR" sz="1500" b="0" i="0" u="none" strike="noStrike" baseline="0" dirty="0">
+              <a:solidFill>
+                <a:schemeClr val="tx2"/>
+              </a:solidFill>
+              <a:latin typeface="Times New Roman" panose="02020603050405020304" pitchFamily="18" charset="0"/>
+              <a:cs typeface="Times New Roman" panose="02020603050405020304" pitchFamily="18" charset="0"/>
+            </a:endParaRPr>
+          </a:p>
+          <a:p>
+            <a:pPr marL="0" indent="0">
+              <a:buNone/>
+            </a:pPr>
+            <a:endParaRPr lang="tr-TR" sz="1500" dirty="0">
+              <a:solidFill>
+                <a:schemeClr val="tx2"/>
+              </a:solidFill>
+              <a:latin typeface="Times New Roman" panose="02020603050405020304" pitchFamily="18" charset="0"/>
+              <a:cs typeface="Times New Roman" panose="02020603050405020304" pitchFamily="18" charset="0"/>
+            </a:endParaRPr>
+          </a:p>
+          <a:p>
+            <a:pPr marL="0" indent="0">
+              <a:buNone/>
+            </a:pPr>
+            <a:r>
+              <a:rPr lang="tr-TR" sz="2400" b="0" i="0" u="none" strike="noStrike" baseline="0" dirty="0">
+                <a:solidFill>
+                  <a:schemeClr val="tx1">
+                    <a:lumMod val="95000"/>
+                    <a:lumOff val="5000"/>
+                  </a:schemeClr>
+                </a:solidFill>
+                <a:latin typeface="Times New Roman" panose="02020603050405020304" pitchFamily="18" charset="0"/>
+                <a:cs typeface="Times New Roman" panose="02020603050405020304" pitchFamily="18" charset="0"/>
+              </a:rPr>
+              <a:t>Yukarıdaki G1= 10 değeri A marka deterjanı tercih eden ev hanımlarının sayısını ,..., G6= 7 değeri de  F marka deterjanı tercih eden ev hanımlarının sayısını ifade etmektedir</a:t>
+            </a:r>
+            <a:r>
+              <a:rPr lang="tr-TR" sz="1800" b="0" i="0" u="none" strike="noStrike" baseline="0" dirty="0">
+                <a:solidFill>
+                  <a:schemeClr val="tx1">
+                    <a:lumMod val="95000"/>
+                    <a:lumOff val="5000"/>
+                  </a:schemeClr>
+                </a:solidFill>
+                <a:latin typeface="Times New Roman" panose="02020603050405020304" pitchFamily="18" charset="0"/>
+                <a:cs typeface="Times New Roman" panose="02020603050405020304" pitchFamily="18" charset="0"/>
+              </a:rPr>
+              <a:t>.</a:t>
+            </a:r>
+          </a:p>
+          <a:p>
+            <a:pPr marL="0" indent="0">
+              <a:buNone/>
+            </a:pPr>
+            <a:endParaRPr lang="tr-TR" sz="1500" dirty="0">
+              <a:solidFill>
+                <a:schemeClr val="tx2"/>
+              </a:solidFill>
+            </a:endParaRPr>
+          </a:p>
+          <a:p>
+            <a:pPr marL="0" indent="0">
+              <a:buNone/>
+            </a:pPr>
+            <a:r>
+              <a:rPr lang="tr-TR" sz="1500" dirty="0">
+                <a:solidFill>
+                  <a:schemeClr val="tx2"/>
+                </a:solidFill>
+              </a:rPr>
+              <a:t> </a:t>
+            </a:r>
+          </a:p>
+        </p:txBody>
+      </p:sp>
+      <p:graphicFrame>
+        <p:nvGraphicFramePr>
+          <p:cNvPr id="5" name="Tablo 5">
+            <a:extLst>
+              <a:ext uri="{FF2B5EF4-FFF2-40B4-BE49-F238E27FC236}">
+                <a16:creationId xmlns:a16="http://schemas.microsoft.com/office/drawing/2014/main" id="{FFCEC9B2-ED68-4E60-83AF-2992E39176D2}"/>
+              </a:ext>
+            </a:extLst>
+          </p:cNvPr>
+          <p:cNvGraphicFramePr>
+            <a:graphicFrameLocks noGrp="1"/>
+          </p:cNvGraphicFramePr>
+          <p:nvPr/>
+        </p:nvGraphicFramePr>
+        <p:xfrm>
+          <a:off x="788821" y="3277611"/>
+          <a:ext cx="8128000" cy="737868"/>
+        </p:xfrm>
+        <a:graphic>
+          <a:graphicData uri="http://schemas.openxmlformats.org/drawingml/2006/table">
+            <a:tbl>
+              <a:tblPr firstRow="1" bandRow="1">
+                <a:tableStyleId>{5C22544A-7EE6-4342-B048-85BDC9FD1C3A}</a:tableStyleId>
+              </a:tblPr>
+              <a:tblGrid>
+                <a:gridCol w="8128000">
+                  <a:extLst>
+                    <a:ext uri="{9D8B030D-6E8A-4147-A177-3AD203B41FA5}">
+                      <a16:colId xmlns:a16="http://schemas.microsoft.com/office/drawing/2014/main" val="653472025"/>
+                    </a:ext>
+                  </a:extLst>
+                </a:gridCol>
+              </a:tblGrid>
+              <a:tr h="0">
+                <a:tc>
+                  <a:txBody>
+                    <a:bodyPr/>
+                    <a:lstStyle/>
+                    <a:p>
+                      <a:r>
+                        <a:rPr lang="tr-TR" sz="1800" dirty="0"/>
+                        <a:t>Sınıflar (Deterjan Markası)            A       B       C       D       E       F               TOPLAM </a:t>
+                      </a:r>
+                    </a:p>
+                  </a:txBody>
+                  <a:tcPr marL="92707" marR="92707" marT="46354" marB="46354"/>
+                </a:tc>
+                <a:extLst>
+                  <a:ext uri="{0D108BD9-81ED-4DB2-BD59-A6C34878D82A}">
+                    <a16:rowId xmlns:a16="http://schemas.microsoft.com/office/drawing/2014/main" val="3514028458"/>
+                  </a:ext>
+                </a:extLst>
+              </a:tr>
+              <a:tr h="370840">
+                <a:tc>
+                  <a:txBody>
+                    <a:bodyPr/>
+                    <a:lstStyle/>
+                    <a:p>
+                      <a:r>
+                        <a:rPr lang="tr-TR" sz="1800" b="1" dirty="0">
+                          <a:solidFill>
+                            <a:schemeClr val="tx1"/>
+                          </a:solidFill>
+                        </a:rPr>
+                        <a:t>Gözlenen Frekanslar                      10     17     23     15     18      7                     90   </a:t>
+                      </a:r>
+                    </a:p>
+                  </a:txBody>
+                  <a:tcPr marL="92707" marR="92707" marT="46354" marB="46354"/>
+                </a:tc>
+                <a:extLst>
+                  <a:ext uri="{0D108BD9-81ED-4DB2-BD59-A6C34878D82A}">
+                    <a16:rowId xmlns:a16="http://schemas.microsoft.com/office/drawing/2014/main" val="4209658101"/>
+                  </a:ext>
+                </a:extLst>
+              </a:tr>
+            </a:tbl>
+          </a:graphicData>
+        </a:graphic>
+      </p:graphicFrame>
+      <p:sp>
+        <p:nvSpPr>
+          <p:cNvPr id="18" name="Başlık 1">
+            <a:extLst>
+              <a:ext uri="{FF2B5EF4-FFF2-40B4-BE49-F238E27FC236}">
+                <a16:creationId xmlns:a16="http://schemas.microsoft.com/office/drawing/2014/main" id="{2BD34178-C660-43AD-80EC-29667DBDC186}"/>
+              </a:ext>
+            </a:extLst>
+          </p:cNvPr>
+          <p:cNvSpPr>
+            <a:spLocks noGrp="1"/>
+          </p:cNvSpPr>
+          <p:nvPr>
+            <p:ph type="title"/>
+          </p:nvPr>
+        </p:nvSpPr>
+        <p:spPr>
+          <a:xfrm>
+            <a:off x="258802" y="163680"/>
+            <a:ext cx="10579398" cy="1299411"/>
+          </a:xfrm>
+        </p:spPr>
+        <p:txBody>
+          <a:bodyPr>
+            <a:normAutofit/>
+          </a:bodyPr>
+          <a:lstStyle/>
+          <a:p>
+            <a:r>
+              <a:rPr lang="tr-TR" sz="3600" dirty="0">
+                <a:solidFill>
+                  <a:schemeClr val="tx2"/>
+                </a:solidFill>
+                <a:latin typeface="Times New Roman" panose="02020603050405020304" pitchFamily="18" charset="0"/>
+                <a:cs typeface="Times New Roman" panose="02020603050405020304" pitchFamily="18" charset="0"/>
+              </a:rPr>
+              <a:t>ÖRNEK:</a:t>
+            </a:r>
+          </a:p>
+        </p:txBody>
+      </p:sp>
+    </p:spTree>
+    <p:extLst>
+      <p:ext uri="{BB962C8B-B14F-4D97-AF65-F5344CB8AC3E}">
+        <p14:creationId xmlns:p14="http://schemas.microsoft.com/office/powerpoint/2010/main" val="3993607204"/>
+      </p:ext>
+    </p:extLst>
+  </p:cSld>
+  <p:clrMapOvr>
+    <a:masterClrMapping/>
+  </p:clrMapOvr>
+  <p:timing>
+    <p:tnLst>
+      <p:par>
+        <p:cTn id="1" dur="indefinite" restart="never" nodeType="tmRoot">
+          <p:childTnLst>
+            <p:seq concurrent="1" nextAc="seek">
+              <p:cTn id="2" dur="indefinite" nodeType="mainSeq">
+                <p:childTnLst>
+                  <p:par>
+                    <p:cTn id="3" fill="hold">
+                      <p:stCondLst>
+                        <p:cond delay="indefinite"/>
+                      </p:stCondLst>
+                      <p:childTnLst>
+                        <p:par>
+                          <p:cTn id="4" fill="hold">
+                            <p:stCondLst>
+                              <p:cond delay="0"/>
+                            </p:stCondLst>
+                            <p:childTnLst>
+                              <p:par>
+                                <p:cTn id="5" presetID="10" presetClass="entr" presetSubtype="0" fill="hold" nodeType="clickEffect">
+                                  <p:stCondLst>
+                                    <p:cond delay="0"/>
+                                  </p:stCondLst>
+                                  <p:childTnLst>
+                                    <p:set>
+                                      <p:cBhvr>
+                                        <p:cTn id="6" dur="1" fill="hold">
+                                          <p:stCondLst>
+                                            <p:cond delay="0"/>
+                                          </p:stCondLst>
+                                        </p:cTn>
+                                        <p:tgtEl>
+                                          <p:spTgt spid="12">
+                                            <p:txEl>
+                                              <p:pRg st="1" end="1"/>
+                                            </p:txEl>
+                                          </p:spTgt>
+                                        </p:tgtEl>
+                                        <p:attrNameLst>
+                                          <p:attrName>style.visibility</p:attrName>
+                                        </p:attrNameLst>
+                                      </p:cBhvr>
+                                      <p:to>
+                                        <p:strVal val="visible"/>
+                                      </p:to>
+                                    </p:set>
+                                    <p:animEffect transition="in" filter="fade">
+                                      <p:cBhvr>
+                                        <p:cTn id="7" dur="500"/>
+                                        <p:tgtEl>
+                                          <p:spTgt spid="12">
+                                            <p:txEl>
+                                              <p:pRg st="1" end="1"/>
+                                            </p:txEl>
+                                          </p:spTgt>
+                                        </p:tgtEl>
+                                      </p:cBhvr>
+                                    </p:animEffect>
+                                  </p:childTnLst>
+                                </p:cTn>
+                              </p:par>
+                            </p:childTnLst>
+                          </p:cTn>
+                        </p:par>
+                      </p:childTnLst>
+                    </p:cTn>
+                  </p:par>
+                  <p:par>
+                    <p:cTn id="8" fill="hold">
+                      <p:stCondLst>
+                        <p:cond delay="indefinite"/>
+                      </p:stCondLst>
+                      <p:childTnLst>
+                        <p:par>
+                          <p:cTn id="9" fill="hold">
+                            <p:stCondLst>
+                              <p:cond delay="0"/>
+                            </p:stCondLst>
+                            <p:childTnLst>
+                              <p:par>
+                                <p:cTn id="10" presetID="10" presetClass="entr" presetSubtype="0" fill="hold" nodeType="clickEffect">
+                                  <p:stCondLst>
+                                    <p:cond delay="0"/>
+                                  </p:stCondLst>
+                                  <p:childTnLst>
+                                    <p:set>
+                                      <p:cBhvr>
+                                        <p:cTn id="11" dur="1" fill="hold">
+                                          <p:stCondLst>
+                                            <p:cond delay="0"/>
+                                          </p:stCondLst>
+                                        </p:cTn>
+                                        <p:tgtEl>
+                                          <p:spTgt spid="5"/>
+                                        </p:tgtEl>
+                                        <p:attrNameLst>
+                                          <p:attrName>style.visibility</p:attrName>
+                                        </p:attrNameLst>
+                                      </p:cBhvr>
+                                      <p:to>
+                                        <p:strVal val="visible"/>
+                                      </p:to>
+                                    </p:set>
+                                    <p:animEffect transition="in" filter="fade">
+                                      <p:cBhvr>
+                                        <p:cTn id="12" dur="500"/>
+                                        <p:tgtEl>
+                                          <p:spTgt spid="5"/>
+                                        </p:tgtEl>
+                                      </p:cBhvr>
+                                    </p:animEffect>
+                                  </p:childTnLst>
+                                </p:cTn>
+                              </p:par>
+                            </p:childTnLst>
+                          </p:cTn>
+                        </p:par>
+                      </p:childTnLst>
+                    </p:cTn>
+                  </p:par>
+                  <p:par>
+                    <p:cTn id="13" fill="hold">
+                      <p:stCondLst>
+                        <p:cond delay="indefinite"/>
+                      </p:stCondLst>
+                      <p:childTnLst>
+                        <p:par>
+                          <p:cTn id="14" fill="hold">
+                            <p:stCondLst>
+                              <p:cond delay="0"/>
+                            </p:stCondLst>
+                            <p:childTnLst>
+                              <p:par>
+                                <p:cTn id="15" presetID="10" presetClass="entr" presetSubtype="0" fill="hold" nodeType="clickEffect">
+                                  <p:stCondLst>
+                                    <p:cond delay="0"/>
+                                  </p:stCondLst>
+                                  <p:childTnLst>
+                                    <p:set>
+                                      <p:cBhvr>
+                                        <p:cTn id="16" dur="1" fill="hold">
+                                          <p:stCondLst>
+                                            <p:cond delay="0"/>
+                                          </p:stCondLst>
+                                        </p:cTn>
+                                        <p:tgtEl>
+                                          <p:spTgt spid="12">
+                                            <p:txEl>
+                                              <p:pRg st="10" end="10"/>
+                                            </p:txEl>
+                                          </p:spTgt>
+                                        </p:tgtEl>
+                                        <p:attrNameLst>
+                                          <p:attrName>style.visibility</p:attrName>
+                                        </p:attrNameLst>
+                                      </p:cBhvr>
+                                      <p:to>
+                                        <p:strVal val="visible"/>
+                                      </p:to>
+                                    </p:set>
+                                    <p:animEffect transition="in" filter="fade">
+                                      <p:cBhvr>
+                                        <p:cTn id="17" dur="500"/>
+                                        <p:tgtEl>
+                                          <p:spTgt spid="12">
+                                            <p:txEl>
+                                              <p:pRg st="10" end="10"/>
+                                            </p:txEl>
+                                          </p:spTgt>
+                                        </p:tgtEl>
+                                      </p:cBhvr>
+                                    </p:animEffect>
+                                  </p:childTnLst>
+                                </p:cTn>
+                              </p:par>
+                            </p:childTnLst>
+                          </p:cTn>
+                        </p:par>
+                      </p:childTnLst>
+                    </p:cTn>
+                  </p:par>
+                </p:childTnLst>
+              </p:cTn>
+              <p:prevCondLst>
+                <p:cond evt="onPrev" delay="0">
+                  <p:tgtEl>
+                    <p:sldTgt/>
+                  </p:tgtEl>
+                </p:cond>
+              </p:prevCondLst>
+              <p:nextCondLst>
+                <p:cond evt="onNext" delay="0">
+                  <p:tgtEl>
+                    <p:sldTgt/>
+                  </p:tgtEl>
+                </p:cond>
+              </p:nextCondLst>
+            </p:seq>
+          </p:childTnLst>
+        </p:cTn>
+      </p:par>
+    </p:tnLst>
+  </p:timing>
+</p:sld>
+</file>
+
+<file path=ppt/slides/slide12.xml><?xml version="1.0" encoding="utf-8"?>
+<p:sld xmlns:a="http://schemas.openxmlformats.org/drawingml/2006/main" xmlns:r="http://schemas.openxmlformats.org/officeDocument/2006/relationships" xmlns:p="http://schemas.openxmlformats.org/presentationml/2006/main">
+  <p:cSld>
     <p:bg>
       <p:bgPr>
         <a:solidFill>
@@ -9419,7 +10049,7 @@
           <a:p>
             <a:fld id="{3F69A0C6-7921-40C0-9BF7-29A90F37EBCE}" type="slidenum">
               <a:rPr lang="tr-TR" smtClean="0"/>
-              <a:t>11</a:t>
+              <a:t>12</a:t>
             </a:fld>
             <a:endParaRPr lang="tr-TR" dirty="0"/>
           </a:p>
@@ -9945,7 +10575,7 @@
 </p:sld>
 </file>
 
-<file path=ppt/slides/slide12.xml><?xml version="1.0" encoding="utf-8"?>
+<file path=ppt/slides/slide13.xml><?xml version="1.0" encoding="utf-8"?>
 <p:sld xmlns:a="http://schemas.openxmlformats.org/drawingml/2006/main" xmlns:r="http://schemas.openxmlformats.org/officeDocument/2006/relationships" xmlns:p="http://schemas.openxmlformats.org/presentationml/2006/main">
   <p:cSld>
     <p:bg>
@@ -12034,7 +12664,7 @@
           <a:p>
             <a:fld id="{3F69A0C6-7921-40C0-9BF7-29A90F37EBCE}" type="slidenum">
               <a:rPr lang="tr-TR" smtClean="0"/>
-              <a:t>12</a:t>
+              <a:t>13</a:t>
             </a:fld>
             <a:endParaRPr lang="tr-TR" dirty="0"/>
           </a:p>
@@ -12053,7 +12683,7 @@
 </p:sld>
 </file>
 
-<file path=ppt/slides/slide13.xml><?xml version="1.0" encoding="utf-8"?>
+<file path=ppt/slides/slide14.xml><?xml version="1.0" encoding="utf-8"?>
 <p:sld xmlns:a="http://schemas.openxmlformats.org/drawingml/2006/main" xmlns:r="http://schemas.openxmlformats.org/officeDocument/2006/relationships" xmlns:p="http://schemas.openxmlformats.org/presentationml/2006/main">
   <p:cSld>
     <p:bg>
@@ -14213,7 +14843,7 @@
           <a:p>
             <a:fld id="{3F69A0C6-7921-40C0-9BF7-29A90F37EBCE}" type="slidenum">
               <a:rPr lang="tr-TR" smtClean="0"/>
-              <a:t>13</a:t>
+              <a:t>14</a:t>
             </a:fld>
             <a:endParaRPr lang="tr-TR" dirty="0"/>
           </a:p>

</xml_diff>